<commit_message>
Adicionando closures na apresentacao
</commit_message>
<xml_diff>
--- a/Seminario/Apresentacao Groovy.pptx
+++ b/Seminario/Apresentacao Groovy.pptx
@@ -5,7 +5,7 @@
     <p:sldMasterId id="2147483660" r:id="rId1"/>
   </p:sldMasterIdLst>
   <p:notesMasterIdLst>
-    <p:notesMasterId r:id="rId26"/>
+    <p:notesMasterId r:id="rId27"/>
   </p:notesMasterIdLst>
   <p:sldIdLst>
     <p:sldId id="256" r:id="rId2"/>
@@ -26,12 +26,13 @@
     <p:sldId id="278" r:id="rId17"/>
     <p:sldId id="269" r:id="rId18"/>
     <p:sldId id="271" r:id="rId19"/>
-    <p:sldId id="267" r:id="rId20"/>
-    <p:sldId id="273" r:id="rId21"/>
-    <p:sldId id="279" r:id="rId22"/>
-    <p:sldId id="280" r:id="rId23"/>
-    <p:sldId id="284" r:id="rId24"/>
-    <p:sldId id="259" r:id="rId25"/>
+    <p:sldId id="286" r:id="rId20"/>
+    <p:sldId id="267" r:id="rId21"/>
+    <p:sldId id="273" r:id="rId22"/>
+    <p:sldId id="279" r:id="rId23"/>
+    <p:sldId id="280" r:id="rId24"/>
+    <p:sldId id="284" r:id="rId25"/>
+    <p:sldId id="259" r:id="rId26"/>
   </p:sldIdLst>
   <p:sldSz cx="12192000" cy="6858000"/>
   <p:notesSz cx="6858000" cy="9144000"/>
@@ -553,7 +554,7 @@
           <a:p>
             <a:fld id="{9C0C3D8A-A115-4AF7-8134-3C1A8F747396}" type="slidenum">
               <a:rPr lang="pt-BR" smtClean="0"/>
-              <a:t>19</a:t>
+              <a:t>6</a:t>
             </a:fld>
             <a:endParaRPr lang="pt-BR"/>
           </a:p>
@@ -562,7 +563,7 @@
     </p:spTree>
     <p:extLst>
       <p:ext uri="{BB962C8B-B14F-4D97-AF65-F5344CB8AC3E}">
-        <p14:creationId xmlns:p14="http://schemas.microsoft.com/office/powerpoint/2010/main" val="429168764"/>
+        <p14:creationId xmlns:p14="http://schemas.microsoft.com/office/powerpoint/2010/main" val="2105785979"/>
       </p:ext>
     </p:extLst>
   </p:cSld>
@@ -646,7 +647,7 @@
     </p:spTree>
     <p:extLst>
       <p:ext uri="{BB962C8B-B14F-4D97-AF65-F5344CB8AC3E}">
-        <p14:creationId xmlns:p14="http://schemas.microsoft.com/office/powerpoint/2010/main" val="612740879"/>
+        <p14:creationId xmlns:p14="http://schemas.microsoft.com/office/powerpoint/2010/main" val="429168764"/>
       </p:ext>
     </p:extLst>
   </p:cSld>
@@ -722,6 +723,90 @@
             <a:fld id="{9C0C3D8A-A115-4AF7-8134-3C1A8F747396}" type="slidenum">
               <a:rPr lang="pt-BR" smtClean="0"/>
               <a:t>21</a:t>
+            </a:fld>
+            <a:endParaRPr lang="pt-BR"/>
+          </a:p>
+        </p:txBody>
+      </p:sp>
+    </p:spTree>
+    <p:extLst>
+      <p:ext uri="{BB962C8B-B14F-4D97-AF65-F5344CB8AC3E}">
+        <p14:creationId xmlns:p14="http://schemas.microsoft.com/office/powerpoint/2010/main" val="612740879"/>
+      </p:ext>
+    </p:extLst>
+  </p:cSld>
+  <p:clrMapOvr>
+    <a:masterClrMapping/>
+  </p:clrMapOvr>
+</p:notes>
+</file>
+
+<file path=ppt/notesSlides/notesSlide4.xml><?xml version="1.0" encoding="utf-8"?>
+<p:notes xmlns:a="http://schemas.openxmlformats.org/drawingml/2006/main" xmlns:r="http://schemas.openxmlformats.org/officeDocument/2006/relationships" xmlns:p="http://schemas.openxmlformats.org/presentationml/2006/main">
+  <p:cSld>
+    <p:spTree>
+      <p:nvGrpSpPr>
+        <p:cNvPr id="1" name=""/>
+        <p:cNvGrpSpPr/>
+        <p:nvPr/>
+      </p:nvGrpSpPr>
+      <p:grpSpPr>
+        <a:xfrm>
+          <a:off x="0" y="0"/>
+          <a:ext cx="0" cy="0"/>
+          <a:chOff x="0" y="0"/>
+          <a:chExt cx="0" cy="0"/>
+        </a:xfrm>
+      </p:grpSpPr>
+      <p:sp>
+        <p:nvSpPr>
+          <p:cNvPr id="2" name="Espaço Reservado para Imagem de Slide 1"/>
+          <p:cNvSpPr>
+            <a:spLocks noGrp="1" noRot="1" noChangeAspect="1"/>
+          </p:cNvSpPr>
+          <p:nvPr>
+            <p:ph type="sldImg"/>
+          </p:nvPr>
+        </p:nvSpPr>
+        <p:spPr/>
+      </p:sp>
+      <p:sp>
+        <p:nvSpPr>
+          <p:cNvPr id="3" name="Espaço Reservado para Anotações 2"/>
+          <p:cNvSpPr>
+            <a:spLocks noGrp="1"/>
+          </p:cNvSpPr>
+          <p:nvPr>
+            <p:ph type="body" idx="1"/>
+          </p:nvPr>
+        </p:nvSpPr>
+        <p:spPr/>
+        <p:txBody>
+          <a:bodyPr/>
+          <a:lstStyle/>
+          <a:p>
+            <a:endParaRPr lang="pt-BR" dirty="0"/>
+          </a:p>
+        </p:txBody>
+      </p:sp>
+      <p:sp>
+        <p:nvSpPr>
+          <p:cNvPr id="4" name="Espaço Reservado para Número de Slide 3"/>
+          <p:cNvSpPr>
+            <a:spLocks noGrp="1"/>
+          </p:cNvSpPr>
+          <p:nvPr>
+            <p:ph type="sldNum" sz="quarter" idx="10"/>
+          </p:nvPr>
+        </p:nvSpPr>
+        <p:spPr/>
+        <p:txBody>
+          <a:bodyPr/>
+          <a:lstStyle/>
+          <a:p>
+            <a:fld id="{9C0C3D8A-A115-4AF7-8134-3C1A8F747396}" type="slidenum">
+              <a:rPr lang="pt-BR" smtClean="0"/>
+              <a:t>22</a:t>
             </a:fld>
             <a:endParaRPr lang="pt-BR"/>
           </a:p>
@@ -6916,6 +7001,13 @@
   <p:clrMapOvr>
     <a:masterClrMapping/>
   </p:clrMapOvr>
+  <p:timing>
+    <p:tnLst>
+      <p:par>
+        <p:cTn id="1" dur="indefinite" restart="never" nodeType="tmRoot"/>
+      </p:par>
+    </p:tnLst>
+  </p:timing>
 </p:sld>
 </file>
 
@@ -8728,7 +8820,7 @@
         </p:nvSpPr>
         <p:spPr>
           <a:xfrm>
-            <a:off x="1484309" y="0"/>
+            <a:off x="1379807" y="-50075"/>
             <a:ext cx="10018713" cy="1752599"/>
           </a:xfrm>
         </p:spPr>
@@ -8737,8 +8829,8 @@
           <a:lstStyle/>
           <a:p>
             <a:r>
-              <a:rPr lang="pt-BR" dirty="0" smtClean="0"/>
-              <a:t>Métodos</a:t>
+              <a:rPr lang="pt-BR" dirty="0" err="1" smtClean="0"/>
+              <a:t>Closures</a:t>
             </a:r>
             <a:endParaRPr lang="pt-BR" dirty="0"/>
           </a:p>
@@ -8756,8 +8848,8 @@
         </p:nvSpPr>
         <p:spPr>
           <a:xfrm>
-            <a:off x="1484310" y="1689463"/>
-            <a:ext cx="10018713" cy="5168537"/>
+            <a:off x="1484310" y="1752599"/>
+            <a:ext cx="10018713" cy="5105401"/>
           </a:xfrm>
         </p:spPr>
         <p:txBody>
@@ -8767,60 +8859,136 @@
           <a:lstStyle/>
           <a:p>
             <a:pPr algn="just"/>
+            <a:r>
+              <a:rPr lang="pt-BR" sz="2000" dirty="0" err="1"/>
+              <a:t>Closures</a:t>
+            </a:r>
+            <a:r>
+              <a:rPr lang="pt-BR" sz="2000" dirty="0"/>
+              <a:t> nada mais são do que pedaços de código tratados como objetos, e como tal podem receber parâmetros e retornar valores</a:t>
+            </a:r>
+            <a:r>
+              <a:rPr lang="pt-BR" sz="2000" dirty="0" smtClean="0"/>
+              <a:t>.</a:t>
+            </a:r>
+          </a:p>
+          <a:p>
+            <a:pPr algn="just"/>
+            <a:endParaRPr lang="pt-BR" sz="2000" dirty="0"/>
+          </a:p>
+          <a:p>
+            <a:pPr algn="just"/>
+            <a:r>
+              <a:rPr lang="pt-BR" sz="2000" dirty="0" err="1" smtClean="0"/>
+              <a:t>Closure</a:t>
+            </a:r>
+            <a:r>
+              <a:rPr lang="pt-BR" sz="2000" dirty="0" smtClean="0"/>
+              <a:t> </a:t>
+            </a:r>
+            <a:r>
+              <a:rPr lang="pt-BR" sz="2000" dirty="0"/>
+              <a:t>é apenas mais objeto para a JVM, tal qual uma </a:t>
+            </a:r>
+            <a:r>
+              <a:rPr lang="pt-BR" sz="2000" dirty="0" err="1" smtClean="0"/>
+              <a:t>String</a:t>
+            </a:r>
+            <a:r>
+              <a:rPr lang="pt-BR" sz="2000" dirty="0" smtClean="0"/>
+              <a:t> </a:t>
+            </a:r>
+            <a:r>
+              <a:rPr lang="pt-BR" sz="2000" dirty="0"/>
+              <a:t>ou um </a:t>
+            </a:r>
+            <a:r>
+              <a:rPr lang="pt-BR" sz="2000" dirty="0" err="1"/>
+              <a:t>Integer</a:t>
+            </a:r>
+            <a:r>
+              <a:rPr lang="pt-BR" sz="2000" dirty="0"/>
+              <a:t>. </a:t>
+            </a:r>
             <a:endParaRPr lang="pt-BR" sz="2000" dirty="0" smtClean="0"/>
           </a:p>
           <a:p>
             <a:pPr algn="just"/>
-            <a:r>
-              <a:rPr lang="pt-BR" sz="2000" dirty="0" smtClean="0"/>
-              <a:t>Implementação similar a Java;</a:t>
-            </a:r>
-          </a:p>
-          <a:p>
-            <a:pPr algn="just"/>
             <a:endParaRPr lang="pt-BR" sz="2000" dirty="0"/>
           </a:p>
           <a:p>
             <a:pPr algn="just"/>
             <a:r>
-              <a:rPr lang="pt-BR" sz="2000" dirty="0" smtClean="0"/>
-              <a:t>Os parâmetros de métodos podem ter ou não tipos definidos e podemos colocar valores padrões a eles;</a:t>
-            </a:r>
-          </a:p>
-          <a:p>
-            <a:pPr marL="0" indent="0" algn="just">
-              <a:buNone/>
-            </a:pPr>
+              <a:rPr lang="pt-BR" sz="2000" dirty="0"/>
+              <a:t>Sua sintaxe é </a:t>
+            </a:r>
+            <a:r>
+              <a:rPr lang="pt-BR" sz="2000" b="1" dirty="0"/>
+              <a:t>{[</a:t>
+            </a:r>
+            <a:r>
+              <a:rPr lang="pt-BR" sz="2000" b="1" dirty="0" err="1"/>
+              <a:t>closureParameters</a:t>
+            </a:r>
+            <a:r>
+              <a:rPr lang="pt-BR" sz="2000" b="1" dirty="0"/>
+              <a:t> -&gt; ] </a:t>
+            </a:r>
+            <a:r>
+              <a:rPr lang="pt-BR" sz="2000" b="1" dirty="0" err="1"/>
+              <a:t>statements</a:t>
+            </a:r>
+            <a:r>
+              <a:rPr lang="pt-BR" sz="2000" b="1" dirty="0" smtClean="0"/>
+              <a:t>}</a:t>
+            </a:r>
+            <a:r>
+              <a:rPr lang="pt-BR" sz="2000" dirty="0" smtClean="0"/>
+              <a:t>.</a:t>
+            </a:r>
+          </a:p>
+          <a:p>
+            <a:pPr algn="just"/>
+            <a:endParaRPr lang="pt-BR" sz="2000" dirty="0"/>
+          </a:p>
+          <a:p>
+            <a:pPr algn="just"/>
             <a:endParaRPr lang="pt-BR" sz="2000" dirty="0" smtClean="0"/>
           </a:p>
           <a:p>
             <a:pPr algn="just"/>
-            <a:r>
-              <a:rPr lang="pt-BR" sz="2000" dirty="0" smtClean="0"/>
-              <a:t>O retorno dos métodos também podem ser arbitrários, assim como os parâmetros;</a:t>
-            </a:r>
-            <a:endParaRPr lang="pt-BR" sz="1400" dirty="0"/>
-          </a:p>
-          <a:p>
-            <a:pPr lvl="1" algn="just"/>
-            <a:endParaRPr lang="pt-BR" sz="1400" dirty="0" smtClean="0"/>
-          </a:p>
-          <a:p>
-            <a:pPr marL="457200" lvl="1" indent="0" algn="just">
-              <a:buNone/>
-            </a:pPr>
-            <a:endParaRPr lang="pt-BR" sz="2000" dirty="0" smtClean="0"/>
-          </a:p>
-          <a:p>
-            <a:pPr algn="just"/>
             <a:endParaRPr lang="pt-BR" sz="2000" dirty="0"/>
           </a:p>
         </p:txBody>
       </p:sp>
+      <p:pic>
+        <p:nvPicPr>
+          <p:cNvPr id="7" name="Imagem 6"/>
+          <p:cNvPicPr>
+            <a:picLocks noChangeAspect="1"/>
+          </p:cNvPicPr>
+          <p:nvPr/>
+        </p:nvPicPr>
+        <p:blipFill>
+          <a:blip r:embed="rId2"/>
+          <a:stretch>
+            <a:fillRect/>
+          </a:stretch>
+        </p:blipFill>
+        <p:spPr>
+          <a:xfrm>
+            <a:off x="7942637" y="4112574"/>
+            <a:ext cx="3743847" cy="2638793"/>
+          </a:xfrm>
+          <a:prstGeom prst="rect">
+            <a:avLst/>
+          </a:prstGeom>
+        </p:spPr>
+      </p:pic>
     </p:spTree>
     <p:extLst>
       <p:ext uri="{BB962C8B-B14F-4D97-AF65-F5344CB8AC3E}">
-        <p14:creationId xmlns:p14="http://schemas.microsoft.com/office/powerpoint/2010/main" val="1011672848"/>
+        <p14:creationId xmlns:p14="http://schemas.microsoft.com/office/powerpoint/2010/main" val="1367439025"/>
       </p:ext>
     </p:extLst>
   </p:cSld>
@@ -8965,11 +9133,7 @@
             </a:r>
             <a:r>
               <a:rPr lang="pt-BR" sz="2000" dirty="0" smtClean="0"/>
-              <a:t> e Google</a:t>
-            </a:r>
-            <a:r>
-              <a:rPr lang="pt-BR" sz="2000" dirty="0" smtClean="0"/>
-              <a:t>.</a:t>
+              <a:t> e Google.</a:t>
             </a:r>
           </a:p>
           <a:p>
@@ -8998,10 +9162,155 @@
   <p:clrMapOvr>
     <a:masterClrMapping/>
   </p:clrMapOvr>
+  <p:timing>
+    <p:tnLst>
+      <p:par>
+        <p:cTn id="1" dur="indefinite" restart="never" nodeType="tmRoot"/>
+      </p:par>
+    </p:tnLst>
+  </p:timing>
 </p:sld>
 </file>
 
 <file path=ppt/slides/slide20.xml><?xml version="1.0" encoding="utf-8"?>
+<p:sld xmlns:a="http://schemas.openxmlformats.org/drawingml/2006/main" xmlns:r="http://schemas.openxmlformats.org/officeDocument/2006/relationships" xmlns:p="http://schemas.openxmlformats.org/presentationml/2006/main">
+  <p:cSld>
+    <p:spTree>
+      <p:nvGrpSpPr>
+        <p:cNvPr id="1" name=""/>
+        <p:cNvGrpSpPr/>
+        <p:nvPr/>
+      </p:nvGrpSpPr>
+      <p:grpSpPr>
+        <a:xfrm>
+          <a:off x="0" y="0"/>
+          <a:ext cx="0" cy="0"/>
+          <a:chOff x="0" y="0"/>
+          <a:chExt cx="0" cy="0"/>
+        </a:xfrm>
+      </p:grpSpPr>
+      <p:sp>
+        <p:nvSpPr>
+          <p:cNvPr id="2" name="Título 1"/>
+          <p:cNvSpPr>
+            <a:spLocks noGrp="1"/>
+          </p:cNvSpPr>
+          <p:nvPr>
+            <p:ph type="title"/>
+          </p:nvPr>
+        </p:nvSpPr>
+        <p:spPr>
+          <a:xfrm>
+            <a:off x="1484309" y="0"/>
+            <a:ext cx="10018713" cy="1752599"/>
+          </a:xfrm>
+        </p:spPr>
+        <p:txBody>
+          <a:bodyPr/>
+          <a:lstStyle/>
+          <a:p>
+            <a:r>
+              <a:rPr lang="pt-BR" dirty="0" smtClean="0"/>
+              <a:t>Métodos</a:t>
+            </a:r>
+            <a:endParaRPr lang="pt-BR" dirty="0"/>
+          </a:p>
+        </p:txBody>
+      </p:sp>
+      <p:sp>
+        <p:nvSpPr>
+          <p:cNvPr id="3" name="Espaço Reservado para Conteúdo 2"/>
+          <p:cNvSpPr>
+            <a:spLocks noGrp="1"/>
+          </p:cNvSpPr>
+          <p:nvPr>
+            <p:ph idx="1"/>
+          </p:nvPr>
+        </p:nvSpPr>
+        <p:spPr>
+          <a:xfrm>
+            <a:off x="1484310" y="1689463"/>
+            <a:ext cx="10018713" cy="5168537"/>
+          </a:xfrm>
+        </p:spPr>
+        <p:txBody>
+          <a:bodyPr>
+            <a:normAutofit/>
+          </a:bodyPr>
+          <a:lstStyle/>
+          <a:p>
+            <a:pPr algn="just"/>
+            <a:endParaRPr lang="pt-BR" sz="2000" dirty="0" smtClean="0"/>
+          </a:p>
+          <a:p>
+            <a:pPr algn="just"/>
+            <a:r>
+              <a:rPr lang="pt-BR" sz="2000" dirty="0" smtClean="0"/>
+              <a:t>Implementação similar a Java;</a:t>
+            </a:r>
+          </a:p>
+          <a:p>
+            <a:pPr algn="just"/>
+            <a:endParaRPr lang="pt-BR" sz="2000" dirty="0"/>
+          </a:p>
+          <a:p>
+            <a:pPr algn="just"/>
+            <a:r>
+              <a:rPr lang="pt-BR" sz="2000" dirty="0" smtClean="0"/>
+              <a:t>Os parâmetros de métodos podem ter ou não tipos definidos e podemos colocar valores padrões a eles;</a:t>
+            </a:r>
+          </a:p>
+          <a:p>
+            <a:pPr marL="0" indent="0" algn="just">
+              <a:buNone/>
+            </a:pPr>
+            <a:endParaRPr lang="pt-BR" sz="2000" dirty="0" smtClean="0"/>
+          </a:p>
+          <a:p>
+            <a:pPr algn="just"/>
+            <a:r>
+              <a:rPr lang="pt-BR" sz="2000" dirty="0" smtClean="0"/>
+              <a:t>O retorno dos métodos também podem ser arbitrários, assim como os parâmetros;</a:t>
+            </a:r>
+            <a:endParaRPr lang="pt-BR" sz="1400" dirty="0"/>
+          </a:p>
+          <a:p>
+            <a:pPr lvl="1" algn="just"/>
+            <a:endParaRPr lang="pt-BR" sz="1400" dirty="0" smtClean="0"/>
+          </a:p>
+          <a:p>
+            <a:pPr marL="457200" lvl="1" indent="0" algn="just">
+              <a:buNone/>
+            </a:pPr>
+            <a:endParaRPr lang="pt-BR" sz="2000" dirty="0" smtClean="0"/>
+          </a:p>
+          <a:p>
+            <a:pPr algn="just"/>
+            <a:endParaRPr lang="pt-BR" sz="2000" dirty="0"/>
+          </a:p>
+        </p:txBody>
+      </p:sp>
+    </p:spTree>
+    <p:extLst>
+      <p:ext uri="{BB962C8B-B14F-4D97-AF65-F5344CB8AC3E}">
+        <p14:creationId xmlns:p14="http://schemas.microsoft.com/office/powerpoint/2010/main" val="1011672848"/>
+      </p:ext>
+    </p:extLst>
+  </p:cSld>
+  <p:clrMapOvr>
+    <a:masterClrMapping/>
+  </p:clrMapOvr>
+  <p:timing>
+    <p:tnLst>
+      <p:par>
+        <p:cTn id="1" dur="indefinite" restart="never" nodeType="tmRoot"/>
+      </p:par>
+    </p:tnLst>
+  </p:timing>
+</p:sld>
+</file>
+
+<file path=ppt/slides/slide21.xml><?xml version="1.0" encoding="utf-8"?>
 <p:sld xmlns:a="http://schemas.openxmlformats.org/drawingml/2006/main" xmlns:r="http://schemas.openxmlformats.org/officeDocument/2006/relationships" xmlns:p="http://schemas.openxmlformats.org/presentationml/2006/main">
   <p:cSld>
     <p:spTree>
@@ -9133,7 +9442,7 @@
 </p:sld>
 </file>
 
-<file path=ppt/slides/slide21.xml><?xml version="1.0" encoding="utf-8"?>
+<file path=ppt/slides/slide22.xml><?xml version="1.0" encoding="utf-8"?>
 <p:sld xmlns:a="http://schemas.openxmlformats.org/drawingml/2006/main" xmlns:r="http://schemas.openxmlformats.org/officeDocument/2006/relationships" xmlns:p="http://schemas.openxmlformats.org/presentationml/2006/main">
   <p:cSld>
     <p:spTree>
@@ -9442,7 +9751,7 @@
 </p:sld>
 </file>
 
-<file path=ppt/slides/slide22.xml><?xml version="1.0" encoding="utf-8"?>
+<file path=ppt/slides/slide23.xml><?xml version="1.0" encoding="utf-8"?>
 <p:sld xmlns:a="http://schemas.openxmlformats.org/drawingml/2006/main" xmlns:r="http://schemas.openxmlformats.org/officeDocument/2006/relationships" xmlns:p="http://schemas.openxmlformats.org/presentationml/2006/main">
   <p:cSld>
     <p:spTree>
@@ -9588,7 +9897,6 @@
               <a:rPr lang="pt-BR" sz="2000" dirty="0"/>
               <a:t>.</a:t>
             </a:r>
-            <a:endParaRPr lang="pt-BR" sz="2000" dirty="0"/>
           </a:p>
           <a:p>
             <a:pPr algn="just"/>
@@ -9729,7 +10037,7 @@
 </p:sld>
 </file>
 
-<file path=ppt/slides/slide23.xml><?xml version="1.0" encoding="utf-8"?>
+<file path=ppt/slides/slide24.xml><?xml version="1.0" encoding="utf-8"?>
 <p:sld xmlns:a="http://schemas.openxmlformats.org/drawingml/2006/main" xmlns:r="http://schemas.openxmlformats.org/officeDocument/2006/relationships" xmlns:p="http://schemas.openxmlformats.org/presentationml/2006/main">
   <p:cSld>
     <p:spTree>
@@ -9902,7 +10210,7 @@
 </p:sld>
 </file>
 
-<file path=ppt/slides/slide24.xml><?xml version="1.0" encoding="utf-8"?>
+<file path=ppt/slides/slide25.xml><?xml version="1.0" encoding="utf-8"?>
 <p:sld xmlns:a="http://schemas.openxmlformats.org/drawingml/2006/main" xmlns:r="http://schemas.openxmlformats.org/officeDocument/2006/relationships" xmlns:p="http://schemas.openxmlformats.org/presentationml/2006/main">
   <p:cSld>
     <p:spTree>
@@ -10537,6 +10845,13 @@
   <p:clrMapOvr>
     <a:masterClrMapping/>
   </p:clrMapOvr>
+  <p:timing>
+    <p:tnLst>
+      <p:par>
+        <p:cTn id="1" dur="indefinite" restart="never" nodeType="tmRoot"/>
+      </p:par>
+    </p:tnLst>
+  </p:timing>
 </p:sld>
 </file>
 
@@ -11165,7 +11480,7 @@
           <p:nvPr/>
         </p:nvPicPr>
         <p:blipFill>
-          <a:blip r:embed="rId2"/>
+          <a:blip r:embed="rId3"/>
           <a:stretch>
             <a:fillRect/>
           </a:stretch>

</xml_diff>